<commit_message>
updates on ibutton data and figures
</commit_message>
<xml_diff>
--- a/figures/Snowmelt date vs fitness.pptx
+++ b/figures/Snowmelt date vs fitness.pptx
@@ -304,7 +304,7 @@
           <a:p>
             <a:fld id="{6BA5D40C-A8DC-479A-A5D3-E7B4936A184B}" type="datetimeFigureOut">
               <a:rPr lang="en-GB" smtClean="0"/>
-              <a:t>13/11/2019</a:t>
+              <a:t>05/12/2019</a:t>
             </a:fld>
             <a:endParaRPr lang="en-GB"/>
           </a:p>
@@ -474,7 +474,7 @@
           <a:p>
             <a:fld id="{6BA5D40C-A8DC-479A-A5D3-E7B4936A184B}" type="datetimeFigureOut">
               <a:rPr lang="en-GB" smtClean="0"/>
-              <a:t>13/11/2019</a:t>
+              <a:t>05/12/2019</a:t>
             </a:fld>
             <a:endParaRPr lang="en-GB"/>
           </a:p>
@@ -654,7 +654,7 @@
           <a:p>
             <a:fld id="{6BA5D40C-A8DC-479A-A5D3-E7B4936A184B}" type="datetimeFigureOut">
               <a:rPr lang="en-GB" smtClean="0"/>
-              <a:t>13/11/2019</a:t>
+              <a:t>05/12/2019</a:t>
             </a:fld>
             <a:endParaRPr lang="en-GB"/>
           </a:p>
@@ -824,7 +824,7 @@
           <a:p>
             <a:fld id="{6BA5D40C-A8DC-479A-A5D3-E7B4936A184B}" type="datetimeFigureOut">
               <a:rPr lang="en-GB" smtClean="0"/>
-              <a:t>13/11/2019</a:t>
+              <a:t>05/12/2019</a:t>
             </a:fld>
             <a:endParaRPr lang="en-GB"/>
           </a:p>
@@ -1070,7 +1070,7 @@
           <a:p>
             <a:fld id="{6BA5D40C-A8DC-479A-A5D3-E7B4936A184B}" type="datetimeFigureOut">
               <a:rPr lang="en-GB" smtClean="0"/>
-              <a:t>13/11/2019</a:t>
+              <a:t>05/12/2019</a:t>
             </a:fld>
             <a:endParaRPr lang="en-GB"/>
           </a:p>
@@ -1358,7 +1358,7 @@
           <a:p>
             <a:fld id="{6BA5D40C-A8DC-479A-A5D3-E7B4936A184B}" type="datetimeFigureOut">
               <a:rPr lang="en-GB" smtClean="0"/>
-              <a:t>13/11/2019</a:t>
+              <a:t>05/12/2019</a:t>
             </a:fld>
             <a:endParaRPr lang="en-GB"/>
           </a:p>
@@ -1785,7 +1785,7 @@
           <a:p>
             <a:fld id="{6BA5D40C-A8DC-479A-A5D3-E7B4936A184B}" type="datetimeFigureOut">
               <a:rPr lang="en-GB" smtClean="0"/>
-              <a:t>13/11/2019</a:t>
+              <a:t>05/12/2019</a:t>
             </a:fld>
             <a:endParaRPr lang="en-GB"/>
           </a:p>
@@ -1903,7 +1903,7 @@
           <a:p>
             <a:fld id="{6BA5D40C-A8DC-479A-A5D3-E7B4936A184B}" type="datetimeFigureOut">
               <a:rPr lang="en-GB" smtClean="0"/>
-              <a:t>13/11/2019</a:t>
+              <a:t>05/12/2019</a:t>
             </a:fld>
             <a:endParaRPr lang="en-GB"/>
           </a:p>
@@ -1998,7 +1998,7 @@
           <a:p>
             <a:fld id="{6BA5D40C-A8DC-479A-A5D3-E7B4936A184B}" type="datetimeFigureOut">
               <a:rPr lang="en-GB" smtClean="0"/>
-              <a:t>13/11/2019</a:t>
+              <a:t>05/12/2019</a:t>
             </a:fld>
             <a:endParaRPr lang="en-GB"/>
           </a:p>
@@ -2275,7 +2275,7 @@
           <a:p>
             <a:fld id="{6BA5D40C-A8DC-479A-A5D3-E7B4936A184B}" type="datetimeFigureOut">
               <a:rPr lang="en-GB" smtClean="0"/>
-              <a:t>13/11/2019</a:t>
+              <a:t>05/12/2019</a:t>
             </a:fld>
             <a:endParaRPr lang="en-GB"/>
           </a:p>
@@ -2528,7 +2528,7 @@
           <a:p>
             <a:fld id="{6BA5D40C-A8DC-479A-A5D3-E7B4936A184B}" type="datetimeFigureOut">
               <a:rPr lang="en-GB" smtClean="0"/>
-              <a:t>13/11/2019</a:t>
+              <a:t>05/12/2019</a:t>
             </a:fld>
             <a:endParaRPr lang="en-GB"/>
           </a:p>
@@ -2741,7 +2741,7 @@
           <a:p>
             <a:fld id="{6BA5D40C-A8DC-479A-A5D3-E7B4936A184B}" type="datetimeFigureOut">
               <a:rPr lang="en-GB" smtClean="0"/>
-              <a:t>13/11/2019</a:t>
+              <a:t>05/12/2019</a:t>
             </a:fld>
             <a:endParaRPr lang="en-GB"/>
           </a:p>
@@ -3125,9 +3125,9 @@
         <p:grpSpPr>
           <a:xfrm>
             <a:off x="3429000" y="1372488"/>
-            <a:ext cx="9067800" cy="8091393"/>
+            <a:ext cx="9982200" cy="8472393"/>
             <a:chOff x="3429000" y="896523"/>
-            <a:chExt cx="8229600" cy="8567358"/>
+            <a:chExt cx="8229600" cy="8970770"/>
           </a:xfrm>
         </p:grpSpPr>
         <p:sp>
@@ -7354,7 +7354,7 @@
           </p:nvSpPr>
           <p:spPr>
             <a:xfrm>
-              <a:off x="3736000" y="8939604"/>
+              <a:off x="3743107" y="9113605"/>
               <a:ext cx="666353" cy="188912"/>
             </a:xfrm>
             <a:prstGeom prst="rect">
@@ -7400,7 +7400,7 @@
           </p:nvSpPr>
           <p:spPr>
             <a:xfrm>
-              <a:off x="4312821" y="8939604"/>
+              <a:off x="4371321" y="9141152"/>
               <a:ext cx="666353" cy="188912"/>
             </a:xfrm>
             <a:prstGeom prst="rect">
@@ -7424,7 +7424,7 @@
                 </a:spcAft>
               </a:pPr>
               <a:r>
-                <a:rPr sz="1600">
+                <a:rPr sz="1600" dirty="0">
                   <a:solidFill>
                     <a:srgbClr val="4D4D4D">
                       <a:alpha val="100000"/>
@@ -7446,7 +7446,7 @@
           </p:nvSpPr>
           <p:spPr>
             <a:xfrm>
-              <a:off x="5041374" y="8979887"/>
+              <a:off x="5017652" y="9153888"/>
               <a:ext cx="610096" cy="148629"/>
             </a:xfrm>
             <a:prstGeom prst="rect">
@@ -7470,7 +7470,7 @@
                 </a:spcAft>
               </a:pPr>
               <a:r>
-                <a:rPr sz="1600">
+                <a:rPr sz="1600" dirty="0">
                   <a:solidFill>
                     <a:srgbClr val="4D4D4D">
                       <a:alpha val="100000"/>
@@ -7492,7 +7492,7 @@
           </p:nvSpPr>
           <p:spPr>
             <a:xfrm>
-              <a:off x="5618194" y="8979887"/>
+              <a:off x="5618194" y="9141152"/>
               <a:ext cx="610096" cy="148629"/>
             </a:xfrm>
             <a:prstGeom prst="rect">
@@ -7538,8 +7538,8 @@
           </p:nvSpPr>
           <p:spPr>
             <a:xfrm>
-              <a:off x="4456593" y="9200915"/>
-              <a:ext cx="1377850" cy="150614"/>
+              <a:off x="4456593" y="9427354"/>
+              <a:ext cx="1548084" cy="439939"/>
             </a:xfrm>
             <a:prstGeom prst="rect">
               <a:avLst/>
@@ -7562,7 +7562,7 @@
                 </a:spcAft>
               </a:pPr>
               <a:r>
-                <a:rPr sz="1600">
+                <a:rPr sz="2000" dirty="0">
                   <a:solidFill>
                     <a:srgbClr val="000000">
                       <a:alpha val="100000"/>
@@ -7608,7 +7608,7 @@
                 </a:spcAft>
               </a:pPr>
               <a:r>
-                <a:rPr sz="1600">
+                <a:rPr sz="2000" dirty="0">
                   <a:solidFill>
                     <a:srgbClr val="000000">
                       <a:alpha val="100000"/>
@@ -13491,7 +13491,7 @@
           </p:nvSpPr>
           <p:spPr>
             <a:xfrm>
-              <a:off x="8017593" y="8979887"/>
+              <a:off x="8017593" y="9153887"/>
               <a:ext cx="610096" cy="148629"/>
             </a:xfrm>
             <a:prstGeom prst="rect">
@@ -13515,7 +13515,7 @@
                 </a:spcAft>
               </a:pPr>
               <a:r>
-                <a:rPr sz="1600">
+                <a:rPr sz="1600" dirty="0">
                   <a:solidFill>
                     <a:srgbClr val="4D4D4D">
                       <a:alpha val="100000"/>
@@ -13537,7 +13537,7 @@
           </p:nvSpPr>
           <p:spPr>
             <a:xfrm>
-              <a:off x="8597534" y="8979887"/>
+              <a:off x="8597534" y="9153887"/>
               <a:ext cx="542230" cy="148629"/>
             </a:xfrm>
             <a:prstGeom prst="rect">
@@ -13561,7 +13561,7 @@
                 </a:spcAft>
               </a:pPr>
               <a:r>
-                <a:rPr sz="1600">
+                <a:rPr sz="1600" dirty="0">
                   <a:solidFill>
                     <a:srgbClr val="4D4D4D">
                       <a:alpha val="100000"/>
@@ -13583,7 +13583,7 @@
           </p:nvSpPr>
           <p:spPr>
             <a:xfrm>
-              <a:off x="9075290" y="8979887"/>
+              <a:off x="9075290" y="9153887"/>
               <a:ext cx="542230" cy="148629"/>
             </a:xfrm>
             <a:prstGeom prst="rect">
@@ -13629,7 +13629,7 @@
           </p:nvSpPr>
           <p:spPr>
             <a:xfrm>
-              <a:off x="9604525" y="8939604"/>
+              <a:off x="9604525" y="9113605"/>
               <a:ext cx="644028" cy="188912"/>
             </a:xfrm>
             <a:prstGeom prst="rect">
@@ -13669,14 +13669,14 @@
         </p:sp>
         <p:sp>
           <p:nvSpPr>
-            <p:cNvPr id="249" name="tx249"/>
-            <p:cNvSpPr/>
-            <p:nvPr/>
-          </p:nvSpPr>
-          <p:spPr>
-            <a:xfrm>
-              <a:off x="8571393" y="9200915"/>
-              <a:ext cx="1377850" cy="150614"/>
+            <p:cNvPr id="250" name="tx250"/>
+            <p:cNvSpPr/>
+            <p:nvPr/>
+          </p:nvSpPr>
+          <p:spPr>
+            <a:xfrm rot="-5400000">
+              <a:off x="7224203" y="5158696"/>
+              <a:ext cx="880963" cy="188317"/>
             </a:xfrm>
             <a:prstGeom prst="rect">
               <a:avLst/>
@@ -13699,53 +13699,7 @@
                 </a:spcAft>
               </a:pPr>
               <a:r>
-                <a:rPr sz="1600">
-                  <a:solidFill>
-                    <a:srgbClr val="000000">
-                      <a:alpha val="100000"/>
-                    </a:srgbClr>
-                  </a:solidFill>
-                  <a:latin typeface="Arial"/>
-                  <a:cs typeface="Arial"/>
-                </a:rPr>
-                <a:t>Snowmelt Date</a:t>
-              </a:r>
-            </a:p>
-          </p:txBody>
-        </p:sp>
-        <p:sp>
-          <p:nvSpPr>
-            <p:cNvPr id="250" name="tx250"/>
-            <p:cNvSpPr/>
-            <p:nvPr/>
-          </p:nvSpPr>
-          <p:spPr>
-            <a:xfrm rot="-5400000">
-              <a:off x="7224203" y="5158696"/>
-              <a:ext cx="880963" cy="188317"/>
-            </a:xfrm>
-            <a:prstGeom prst="rect">
-              <a:avLst/>
-            </a:prstGeom>
-            <a:noFill/>
-          </p:spPr>
-          <p:txBody>
-            <a:bodyPr wrap="none" lIns="0" tIns="0" rIns="0" bIns="0" anchor="ctr" anchorCtr="1"/>
-            <a:lstStyle/>
-            <a:p>
-              <a:pPr marL="0" marR="0" indent="0" algn="l">
-                <a:lnSpc>
-                  <a:spcPts val="1600"/>
-                </a:lnSpc>
-                <a:spcBef>
-                  <a:spcPts val="0"/>
-                </a:spcBef>
-                <a:spcAft>
-                  <a:spcPts val="0"/>
-                </a:spcAft>
-              </a:pPr>
-              <a:r>
-                <a:rPr sz="1600" dirty="0">
+                <a:rPr sz="2000" dirty="0">
                   <a:solidFill>
                     <a:srgbClr val="000000">
                       <a:alpha val="100000"/>
@@ -13784,172 +13738,6 @@
             <a:lstStyle/>
             <a:p>
               <a:endParaRPr/>
-            </a:p>
-          </p:txBody>
-        </p:sp>
-        <p:sp>
-          <p:nvSpPr>
-            <p:cNvPr id="252" name="tx252"/>
-            <p:cNvSpPr/>
-            <p:nvPr/>
-          </p:nvSpPr>
-          <p:spPr>
-            <a:xfrm>
-              <a:off x="10604352" y="4108266"/>
-              <a:ext cx="559333" cy="209153"/>
-            </a:xfrm>
-            <a:prstGeom prst="rect">
-              <a:avLst/>
-            </a:prstGeom>
-            <a:noFill/>
-          </p:spPr>
-          <p:txBody>
-            <a:bodyPr wrap="none" lIns="0" tIns="0" rIns="0" bIns="0" anchor="ctr" anchorCtr="1"/>
-            <a:lstStyle/>
-            <a:p>
-              <a:pPr marL="0" marR="0" indent="0" algn="l">
-                <a:lnSpc>
-                  <a:spcPts val="1800"/>
-                </a:lnSpc>
-                <a:spcBef>
-                  <a:spcPts val="0"/>
-                </a:spcBef>
-                <a:spcAft>
-                  <a:spcPts val="0"/>
-                </a:spcAft>
-              </a:pPr>
-              <a:r>
-                <a:rPr sz="1800">
-                  <a:solidFill>
-                    <a:srgbClr val="000000">
-                      <a:alpha val="100000"/>
-                    </a:srgbClr>
-                  </a:solidFill>
-                  <a:latin typeface="Arial"/>
-                  <a:cs typeface="Arial"/>
-                </a:rPr>
-                <a:t>alpha</a:t>
-              </a:r>
-            </a:p>
-          </p:txBody>
-        </p:sp>
-        <p:sp>
-          <p:nvSpPr>
-            <p:cNvPr id="253" name="rc253"/>
-            <p:cNvSpPr/>
-            <p:nvPr/>
-          </p:nvSpPr>
-          <p:spPr>
-            <a:xfrm>
-              <a:off x="10604352" y="4455309"/>
-              <a:ext cx="219455" cy="219456"/>
-            </a:xfrm>
-            <a:prstGeom prst="rect">
-              <a:avLst/>
-            </a:prstGeom>
-            <a:solidFill>
-              <a:srgbClr val="F2F2F2">
-                <a:alpha val="100000"/>
-              </a:srgbClr>
-            </a:solidFill>
-            <a:ln w="13550" cap="rnd">
-              <a:solidFill>
-                <a:srgbClr val="FFFFFF">
-                  <a:alpha val="100000"/>
-                </a:srgbClr>
-              </a:solidFill>
-              <a:prstDash val="solid"/>
-              <a:round/>
-            </a:ln>
-          </p:spPr>
-          <p:txBody>
-            <a:bodyPr/>
-            <a:lstStyle/>
-            <a:p>
-              <a:endParaRPr/>
-            </a:p>
-          </p:txBody>
-        </p:sp>
-        <p:sp>
-          <p:nvSpPr>
-            <p:cNvPr id="254" name="pt254"/>
-            <p:cNvSpPr/>
-            <p:nvPr/>
-          </p:nvSpPr>
-          <p:spPr>
-            <a:xfrm>
-              <a:off x="10689254" y="4540211"/>
-              <a:ext cx="49651" cy="49651"/>
-            </a:xfrm>
-            <a:prstGeom prst="ellipse">
-              <a:avLst/>
-            </a:prstGeom>
-            <a:solidFill>
-              <a:srgbClr val="000000">
-                <a:alpha val="54901"/>
-              </a:srgbClr>
-            </a:solidFill>
-            <a:ln w="9000" cap="rnd">
-              <a:solidFill>
-                <a:srgbClr val="000000">
-                  <a:alpha val="54901"/>
-                </a:srgbClr>
-              </a:solidFill>
-              <a:prstDash val="solid"/>
-              <a:round/>
-            </a:ln>
-          </p:spPr>
-          <p:txBody>
-            <a:bodyPr/>
-            <a:lstStyle/>
-            <a:p>
-              <a:endParaRPr/>
-            </a:p>
-          </p:txBody>
-        </p:sp>
-        <p:sp>
-          <p:nvSpPr>
-            <p:cNvPr id="255" name="tx255"/>
-            <p:cNvSpPr/>
-            <p:nvPr/>
-          </p:nvSpPr>
-          <p:spPr>
-            <a:xfrm>
-              <a:off x="10937681" y="4498660"/>
-              <a:ext cx="247166" cy="129976"/>
-            </a:xfrm>
-            <a:prstGeom prst="rect">
-              <a:avLst/>
-            </a:prstGeom>
-            <a:noFill/>
-          </p:spPr>
-          <p:txBody>
-            <a:bodyPr wrap="none" lIns="0" tIns="0" rIns="0" bIns="0" anchor="ctr" anchorCtr="1"/>
-            <a:lstStyle/>
-            <a:p>
-              <a:pPr marL="0" marR="0" indent="0" algn="l">
-                <a:lnSpc>
-                  <a:spcPts val="1400"/>
-                </a:lnSpc>
-                <a:spcBef>
-                  <a:spcPts val="0"/>
-                </a:spcBef>
-                <a:spcAft>
-                  <a:spcPts val="0"/>
-                </a:spcAft>
-              </a:pPr>
-              <a:r>
-                <a:rPr sz="1400">
-                  <a:solidFill>
-                    <a:srgbClr val="000000">
-                      <a:alpha val="100000"/>
-                    </a:srgbClr>
-                  </a:solidFill>
-                  <a:latin typeface="Arial"/>
-                  <a:cs typeface="Arial"/>
-                </a:rPr>
-                <a:t>0.2</a:t>
-              </a:r>
             </a:p>
           </p:txBody>
         </p:sp>
@@ -14812,6 +14600,58 @@
                 <a:cs typeface="Arial" panose="020B0604020202020204" pitchFamily="34" charset="0"/>
               </a:rPr>
               <a:t>2019</a:t>
+            </a:r>
+          </a:p>
+        </p:txBody>
+      </p:sp>
+      <p:sp>
+        <p:nvSpPr>
+          <p:cNvPr id="274" name="tx98">
+            <a:extLst>
+              <a:ext uri="{FF2B5EF4-FFF2-40B4-BE49-F238E27FC236}">
+                <a16:creationId xmlns:a16="http://schemas.microsoft.com/office/drawing/2014/main" id="{7C251506-C79C-914C-B25B-0F200CEAD86A}"/>
+              </a:ext>
+            </a:extLst>
+          </p:cNvPr>
+          <p:cNvSpPr/>
+          <p:nvPr/>
+        </p:nvSpPr>
+        <p:spPr>
+          <a:xfrm>
+            <a:off x="9576715" y="9429383"/>
+            <a:ext cx="1877769" cy="415498"/>
+          </a:xfrm>
+          <a:prstGeom prst="rect">
+            <a:avLst/>
+          </a:prstGeom>
+          <a:noFill/>
+        </p:spPr>
+        <p:txBody>
+          <a:bodyPr wrap="none" lIns="0" tIns="0" rIns="0" bIns="0" anchor="ctr" anchorCtr="1"/>
+          <a:lstStyle/>
+          <a:p>
+            <a:pPr marL="0" marR="0" indent="0" algn="l">
+              <a:lnSpc>
+                <a:spcPts val="1600"/>
+              </a:lnSpc>
+              <a:spcBef>
+                <a:spcPts val="0"/>
+              </a:spcBef>
+              <a:spcAft>
+                <a:spcPts val="0"/>
+              </a:spcAft>
+            </a:pPr>
+            <a:r>
+              <a:rPr sz="2000" dirty="0">
+                <a:solidFill>
+                  <a:srgbClr val="000000">
+                    <a:alpha val="100000"/>
+                  </a:srgbClr>
+                </a:solidFill>
+                <a:latin typeface="Arial"/>
+                <a:cs typeface="Arial"/>
+              </a:rPr>
+              <a:t>Snowmelt Date</a:t>
             </a:r>
           </a:p>
         </p:txBody>

</xml_diff>